<commit_message>
report + presentation + readme
</commit_message>
<xml_diff>
--- a/report/2024_1_Чашин_Андрей.pptx
+++ b/report/2024_1_Чашин_Андрей.pptx
@@ -10,7 +10,8 @@
     <p:sldId id="259" r:id="rId4"/>
     <p:sldId id="260" r:id="rId5"/>
     <p:sldId id="261" r:id="rId6"/>
-    <p:sldId id="263" r:id="rId7"/>
+    <p:sldId id="264" r:id="rId7"/>
+    <p:sldId id="263" r:id="rId8"/>
   </p:sldIdLst>
   <p:sldSz cx="12192000" cy="6858000"/>
   <p:notesSz cx="6858000" cy="9144000"/>
@@ -6912,6 +6913,135 @@
           <p:cNvPr id="2" name="Заголовок 1">
             <a:extLst>
               <a:ext uri="{FF2B5EF4-FFF2-40B4-BE49-F238E27FC236}">
+                <a16:creationId xmlns:a16="http://schemas.microsoft.com/office/drawing/2014/main" id="{8FAF93DA-D2C7-BE95-133A-FA64FB07B557}"/>
+              </a:ext>
+            </a:extLst>
+          </p:cNvPr>
+          <p:cNvSpPr>
+            <a:spLocks noGrp="1"/>
+          </p:cNvSpPr>
+          <p:nvPr>
+            <p:ph type="title"/>
+          </p:nvPr>
+        </p:nvSpPr>
+        <p:spPr/>
+        <p:txBody>
+          <a:bodyPr/>
+          <a:lstStyle/>
+          <a:p>
+            <a:r>
+              <a:rPr lang="ru-RU" dirty="0"/>
+              <a:t>Решение</a:t>
+            </a:r>
+          </a:p>
+        </p:txBody>
+      </p:sp>
+      <p:sp>
+        <p:nvSpPr>
+          <p:cNvPr id="3" name="Объект 2">
+            <a:extLst>
+              <a:ext uri="{FF2B5EF4-FFF2-40B4-BE49-F238E27FC236}">
+                <a16:creationId xmlns:a16="http://schemas.microsoft.com/office/drawing/2014/main" id="{AD34697A-77BD-BD01-048B-DC88004CF5FC}"/>
+              </a:ext>
+            </a:extLst>
+          </p:cNvPr>
+          <p:cNvSpPr>
+            <a:spLocks noGrp="1"/>
+          </p:cNvSpPr>
+          <p:nvPr>
+            <p:ph idx="1"/>
+          </p:nvPr>
+        </p:nvSpPr>
+        <p:spPr>
+          <a:xfrm>
+            <a:off x="1261872" y="1828800"/>
+            <a:ext cx="3592932" cy="4351337"/>
+          </a:xfrm>
+        </p:spPr>
+        <p:txBody>
+          <a:bodyPr/>
+          <a:lstStyle/>
+          <a:p>
+            <a:r>
+              <a:rPr lang="ru-RU" sz="1800" dirty="0">
+                <a:effectLst/>
+                <a:latin typeface="Century Gothic" panose="020B0502020202020204" pitchFamily="34" charset="0"/>
+                <a:ea typeface="Times New Roman" panose="02020603050405020304" pitchFamily="18" charset="0"/>
+                <a:cs typeface="Times New Roman" panose="02020603050405020304" pitchFamily="18" charset="0"/>
+              </a:rPr>
+              <a:t>Для каждой точки создать список расстояний до всех остальных. Отсортировать эти списки. Числа в центре этих списков и будут минимальные радиусы окружностей, с центрами в соответствующей точке, которые захватывают хотя бы половину всех точек. После найти 2 минимальных радиуса и по соответствующим точкам построить окружности.</a:t>
+            </a:r>
+          </a:p>
+          <a:p>
+            <a:endParaRPr lang="ru-RU" dirty="0"/>
+          </a:p>
+        </p:txBody>
+      </p:sp>
+      <p:pic>
+        <p:nvPicPr>
+          <p:cNvPr id="7" name="Рисунок 6">
+            <a:extLst>
+              <a:ext uri="{FF2B5EF4-FFF2-40B4-BE49-F238E27FC236}">
+                <a16:creationId xmlns:a16="http://schemas.microsoft.com/office/drawing/2014/main" id="{5556DFFB-4B95-94CC-4F34-4C398E7B2EA8}"/>
+              </a:ext>
+            </a:extLst>
+          </p:cNvPr>
+          <p:cNvPicPr>
+            <a:picLocks noChangeAspect="1"/>
+          </p:cNvPicPr>
+          <p:nvPr/>
+        </p:nvPicPr>
+        <p:blipFill>
+          <a:blip r:embed="rId2"/>
+          <a:stretch>
+            <a:fillRect/>
+          </a:stretch>
+        </p:blipFill>
+        <p:spPr>
+          <a:xfrm>
+            <a:off x="5291666" y="771154"/>
+            <a:ext cx="5096586" cy="5315692"/>
+          </a:xfrm>
+          <a:prstGeom prst="rect">
+            <a:avLst/>
+          </a:prstGeom>
+        </p:spPr>
+      </p:pic>
+    </p:spTree>
+    <p:extLst>
+      <p:ext uri="{BB962C8B-B14F-4D97-AF65-F5344CB8AC3E}">
+        <p14:creationId xmlns:p14="http://schemas.microsoft.com/office/powerpoint/2010/main" val="2599831299"/>
+      </p:ext>
+    </p:extLst>
+  </p:cSld>
+  <p:clrMapOvr>
+    <a:masterClrMapping/>
+  </p:clrMapOvr>
+</p:sld>
+</file>
+
+<file path=ppt/slides/slide7.xml><?xml version="1.0" encoding="utf-8"?>
+<p:sld xmlns:a="http://schemas.openxmlformats.org/drawingml/2006/main" xmlns:r="http://schemas.openxmlformats.org/officeDocument/2006/relationships" xmlns:p="http://schemas.openxmlformats.org/presentationml/2006/main">
+  <p:cSld>
+    <p:spTree>
+      <p:nvGrpSpPr>
+        <p:cNvPr id="1" name=""/>
+        <p:cNvGrpSpPr/>
+        <p:nvPr/>
+      </p:nvGrpSpPr>
+      <p:grpSpPr>
+        <a:xfrm>
+          <a:off x="0" y="0"/>
+          <a:ext cx="0" cy="0"/>
+          <a:chOff x="0" y="0"/>
+          <a:chExt cx="0" cy="0"/>
+        </a:xfrm>
+      </p:grpSpPr>
+      <p:sp>
+        <p:nvSpPr>
+          <p:cNvPr id="2" name="Заголовок 1">
+            <a:extLst>
+              <a:ext uri="{FF2B5EF4-FFF2-40B4-BE49-F238E27FC236}">
                 <a16:creationId xmlns:a16="http://schemas.microsoft.com/office/drawing/2014/main" id="{EEDD4578-AE79-41B4-A8EA-BF7E49F96AEC}"/>
               </a:ext>
             </a:extLst>

</xml_diff>